<commit_message>
Change ingredients to full_ingredients
</commit_message>
<xml_diff>
--- a/planning/brainstorm.pptx
+++ b/planning/brainstorm.pptx
@@ -9,7 +9,6 @@
     <p:sldId id="258" r:id="rId3"/>
     <p:sldId id="259" r:id="rId4"/>
     <p:sldId id="260" r:id="rId5"/>
-    <p:sldId id="257" r:id="rId6"/>
   </p:sldIdLst>
   <p:sldSz cx="12192000" cy="6858000"/>
   <p:notesSz cx="6858000" cy="9144000"/>
@@ -108,6 +107,11 @@
       </a:defRPr>
     </a:lvl9pPr>
   </p:defaultTextStyle>
+  <p:extLst>
+    <p:ext uri="{EFAFB233-063F-42B5-8137-9DF3F51BA10A}">
+      <p15:sldGuideLst xmlns:p15="http://schemas.microsoft.com/office/powerpoint/2012/main"/>
+    </p:ext>
+  </p:extLst>
 </p:presentation>
 </file>
 
@@ -260,7 +264,7 @@
           <a:p>
             <a:fld id="{DD91DCB4-2EE8-4239-B572-FD5A9DAFC7B8}" type="datetimeFigureOut">
               <a:rPr lang="en-AU" smtClean="0"/>
-              <a:t>1/10/2020</a:t>
+              <a:t>16/10/2020</a:t>
             </a:fld>
             <a:endParaRPr lang="en-AU"/>
           </a:p>
@@ -460,7 +464,7 @@
           <a:p>
             <a:fld id="{DD91DCB4-2EE8-4239-B572-FD5A9DAFC7B8}" type="datetimeFigureOut">
               <a:rPr lang="en-AU" smtClean="0"/>
-              <a:t>1/10/2020</a:t>
+              <a:t>16/10/2020</a:t>
             </a:fld>
             <a:endParaRPr lang="en-AU"/>
           </a:p>
@@ -670,7 +674,7 @@
           <a:p>
             <a:fld id="{DD91DCB4-2EE8-4239-B572-FD5A9DAFC7B8}" type="datetimeFigureOut">
               <a:rPr lang="en-AU" smtClean="0"/>
-              <a:t>1/10/2020</a:t>
+              <a:t>16/10/2020</a:t>
             </a:fld>
             <a:endParaRPr lang="en-AU"/>
           </a:p>
@@ -870,7 +874,7 @@
           <a:p>
             <a:fld id="{DD91DCB4-2EE8-4239-B572-FD5A9DAFC7B8}" type="datetimeFigureOut">
               <a:rPr lang="en-AU" smtClean="0"/>
-              <a:t>1/10/2020</a:t>
+              <a:t>16/10/2020</a:t>
             </a:fld>
             <a:endParaRPr lang="en-AU"/>
           </a:p>
@@ -1146,7 +1150,7 @@
           <a:p>
             <a:fld id="{DD91DCB4-2EE8-4239-B572-FD5A9DAFC7B8}" type="datetimeFigureOut">
               <a:rPr lang="en-AU" smtClean="0"/>
-              <a:t>1/10/2020</a:t>
+              <a:t>16/10/2020</a:t>
             </a:fld>
             <a:endParaRPr lang="en-AU"/>
           </a:p>
@@ -1414,7 +1418,7 @@
           <a:p>
             <a:fld id="{DD91DCB4-2EE8-4239-B572-FD5A9DAFC7B8}" type="datetimeFigureOut">
               <a:rPr lang="en-AU" smtClean="0"/>
-              <a:t>1/10/2020</a:t>
+              <a:t>16/10/2020</a:t>
             </a:fld>
             <a:endParaRPr lang="en-AU"/>
           </a:p>
@@ -1829,7 +1833,7 @@
           <a:p>
             <a:fld id="{DD91DCB4-2EE8-4239-B572-FD5A9DAFC7B8}" type="datetimeFigureOut">
               <a:rPr lang="en-AU" smtClean="0"/>
-              <a:t>1/10/2020</a:t>
+              <a:t>16/10/2020</a:t>
             </a:fld>
             <a:endParaRPr lang="en-AU"/>
           </a:p>
@@ -1971,7 +1975,7 @@
           <a:p>
             <a:fld id="{DD91DCB4-2EE8-4239-B572-FD5A9DAFC7B8}" type="datetimeFigureOut">
               <a:rPr lang="en-AU" smtClean="0"/>
-              <a:t>1/10/2020</a:t>
+              <a:t>16/10/2020</a:t>
             </a:fld>
             <a:endParaRPr lang="en-AU"/>
           </a:p>
@@ -2084,7 +2088,7 @@
           <a:p>
             <a:fld id="{DD91DCB4-2EE8-4239-B572-FD5A9DAFC7B8}" type="datetimeFigureOut">
               <a:rPr lang="en-AU" smtClean="0"/>
-              <a:t>1/10/2020</a:t>
+              <a:t>16/10/2020</a:t>
             </a:fld>
             <a:endParaRPr lang="en-AU"/>
           </a:p>
@@ -2397,7 +2401,7 @@
           <a:p>
             <a:fld id="{DD91DCB4-2EE8-4239-B572-FD5A9DAFC7B8}" type="datetimeFigureOut">
               <a:rPr lang="en-AU" smtClean="0"/>
-              <a:t>1/10/2020</a:t>
+              <a:t>16/10/2020</a:t>
             </a:fld>
             <a:endParaRPr lang="en-AU"/>
           </a:p>
@@ -2686,7 +2690,7 @@
           <a:p>
             <a:fld id="{DD91DCB4-2EE8-4239-B572-FD5A9DAFC7B8}" type="datetimeFigureOut">
               <a:rPr lang="en-AU" smtClean="0"/>
-              <a:t>1/10/2020</a:t>
+              <a:t>16/10/2020</a:t>
             </a:fld>
             <a:endParaRPr lang="en-AU"/>
           </a:p>
@@ -2929,7 +2933,7 @@
           <a:p>
             <a:fld id="{DD91DCB4-2EE8-4239-B572-FD5A9DAFC7B8}" type="datetimeFigureOut">
               <a:rPr lang="en-AU" smtClean="0"/>
-              <a:t>1/10/2020</a:t>
+              <a:t>16/10/2020</a:t>
             </a:fld>
             <a:endParaRPr lang="en-AU"/>
           </a:p>
@@ -3520,7 +3524,7 @@
         <p:spPr/>
         <p:txBody>
           <a:bodyPr>
-            <a:normAutofit fontScale="77500" lnSpcReduction="20000"/>
+            <a:normAutofit fontScale="85000" lnSpcReduction="20000"/>
           </a:bodyPr>
           <a:lstStyle/>
           <a:p>
@@ -3845,15 +3849,6 @@
               </a:rPr>
               <a:t>tomorrow’s price?</a:t>
             </a:r>
-            <a:endParaRPr lang="en-US" b="0" i="0" dirty="0">
-              <a:solidFill>
-                <a:srgbClr val="3C3C3B"/>
-              </a:solidFill>
-              <a:effectLst/>
-              <a:latin typeface="IBM Plex Sans"/>
-            </a:endParaRPr>
-          </a:p>
-          <a:p>
             <a:br>
               <a:rPr lang="en-US" b="0" i="0" dirty="0">
                 <a:solidFill>
@@ -4730,147 +4725,6 @@
     <p:extLst>
       <p:ext uri="{BB962C8B-B14F-4D97-AF65-F5344CB8AC3E}">
         <p14:creationId xmlns:p14="http://schemas.microsoft.com/office/powerpoint/2010/main" val="1681518824"/>
-      </p:ext>
-    </p:extLst>
-  </p:cSld>
-  <p:clrMapOvr>
-    <a:masterClrMapping/>
-  </p:clrMapOvr>
-</p:sld>
-</file>
-
-<file path=ppt/slides/slide5.xml><?xml version="1.0" encoding="utf-8"?>
-<p:sld xmlns:a="http://schemas.openxmlformats.org/drawingml/2006/main" xmlns:r="http://schemas.openxmlformats.org/officeDocument/2006/relationships" xmlns:p="http://schemas.openxmlformats.org/presentationml/2006/main">
-  <p:cSld>
-    <p:spTree>
-      <p:nvGrpSpPr>
-        <p:cNvPr id="1" name=""/>
-        <p:cNvGrpSpPr/>
-        <p:nvPr/>
-      </p:nvGrpSpPr>
-      <p:grpSpPr>
-        <a:xfrm>
-          <a:off x="0" y="0"/>
-          <a:ext cx="0" cy="0"/>
-          <a:chOff x="0" y="0"/>
-          <a:chExt cx="0" cy="0"/>
-        </a:xfrm>
-      </p:grpSpPr>
-      <p:sp>
-        <p:nvSpPr>
-          <p:cNvPr id="2" name="Title 1">
-            <a:extLst>
-              <a:ext uri="{FF2B5EF4-FFF2-40B4-BE49-F238E27FC236}">
-                <a16:creationId xmlns:a16="http://schemas.microsoft.com/office/drawing/2014/main" id="{E3138A4C-625F-4323-9873-ABEBC36A9839}"/>
-              </a:ext>
-            </a:extLst>
-          </p:cNvPr>
-          <p:cNvSpPr>
-            <a:spLocks noGrp="1"/>
-          </p:cNvSpPr>
-          <p:nvPr>
-            <p:ph type="title"/>
-          </p:nvPr>
-        </p:nvSpPr>
-        <p:spPr/>
-        <p:txBody>
-          <a:bodyPr/>
-          <a:lstStyle/>
-          <a:p>
-            <a:r>
-              <a:rPr lang="en-US" dirty="0"/>
-              <a:t>Scikit learn</a:t>
-            </a:r>
-            <a:endParaRPr lang="en-AU" dirty="0"/>
-          </a:p>
-        </p:txBody>
-      </p:sp>
-      <p:sp>
-        <p:nvSpPr>
-          <p:cNvPr id="3" name="Content Placeholder 2">
-            <a:extLst>
-              <a:ext uri="{FF2B5EF4-FFF2-40B4-BE49-F238E27FC236}">
-                <a16:creationId xmlns:a16="http://schemas.microsoft.com/office/drawing/2014/main" id="{87CD306B-3A56-4434-AFB1-D3BE7D1DFBF0}"/>
-              </a:ext>
-            </a:extLst>
-          </p:cNvPr>
-          <p:cNvSpPr>
-            <a:spLocks noGrp="1"/>
-          </p:cNvSpPr>
-          <p:nvPr>
-            <p:ph idx="1"/>
-          </p:nvPr>
-        </p:nvSpPr>
-        <p:spPr/>
-        <p:txBody>
-          <a:bodyPr/>
-          <a:lstStyle/>
-          <a:p>
-            <a:r>
-              <a:rPr lang="en-US" dirty="0"/>
-              <a:t>Open Source project</a:t>
-            </a:r>
-          </a:p>
-          <a:p>
-            <a:r>
-              <a:rPr lang="en-US" dirty="0"/>
-              <a:t>Python / </a:t>
-            </a:r>
-            <a:r>
-              <a:rPr lang="en-US" dirty="0" err="1"/>
-              <a:t>Numpy</a:t>
-            </a:r>
-            <a:r>
-              <a:rPr lang="en-US" dirty="0"/>
-              <a:t> / SciPy / </a:t>
-            </a:r>
-            <a:r>
-              <a:rPr lang="en-US" dirty="0" err="1"/>
-              <a:t>Cython</a:t>
-            </a:r>
-            <a:endParaRPr lang="en-US" dirty="0"/>
-          </a:p>
-          <a:p>
-            <a:r>
-              <a:rPr lang="en-US" dirty="0"/>
-              <a:t>Simple fit / predict / transform API</a:t>
-            </a:r>
-          </a:p>
-          <a:p>
-            <a:r>
-              <a:rPr lang="en-US" dirty="0"/>
-              <a:t>Model Assessment </a:t>
-            </a:r>
-            <a:r>
-              <a:rPr lang="en-US" dirty="0">
-                <a:sym typeface="Wingdings" panose="05000000000000000000" pitchFamily="2" charset="2"/>
-              </a:rPr>
-              <a:t> to assess the predictive quality of the model</a:t>
-            </a:r>
-            <a:endParaRPr lang="en-US" dirty="0"/>
-          </a:p>
-          <a:p>
-            <a:r>
-              <a:rPr lang="en-US" dirty="0"/>
-              <a:t>Model Selection</a:t>
-            </a:r>
-          </a:p>
-          <a:p>
-            <a:r>
-              <a:rPr lang="en-US" dirty="0"/>
-              <a:t>Model Ensembles</a:t>
-            </a:r>
-            <a:endParaRPr lang="en-AU" dirty="0"/>
-          </a:p>
-          <a:p>
-            <a:endParaRPr lang="en-US" dirty="0"/>
-          </a:p>
-        </p:txBody>
-      </p:sp>
-    </p:spTree>
-    <p:extLst>
-      <p:ext uri="{BB962C8B-B14F-4D97-AF65-F5344CB8AC3E}">
-        <p14:creationId xmlns:p14="http://schemas.microsoft.com/office/powerpoint/2010/main" val="2069462357"/>
       </p:ext>
     </p:extLst>
   </p:cSld>

</xml_diff>